<commit_message>
update graphical abstract + working on app_leah
</commit_message>
<xml_diff>
--- a/graphical_abstract/first_draft.pptx
+++ b/graphical_abstract/first_draft.pptx
@@ -104,6 +104,11 @@
       </a:defRPr>
     </a:lvl9pPr>
   </p:defaultTextStyle>
+  <p:extLst>
+    <p:ext uri="{EFAFB233-063F-42B5-8137-9DF3F51BA10A}">
+      <p15:sldGuideLst xmlns:p15="http://schemas.microsoft.com/office/powerpoint/2012/main"/>
+    </p:ext>
+  </p:extLst>
 </p:presentation>
 </file>
 
@@ -3350,7 +3355,7 @@
         <p:spPr>
           <a:xfrm>
             <a:off x="1" y="0"/>
-            <a:ext cx="1757672" cy="1847088"/>
+            <a:ext cx="1168733" cy="1228189"/>
           </a:xfrm>
           <a:prstGeom prst="rect">
             <a:avLst/>
@@ -3371,7 +3376,7 @@
         </p:nvSpPr>
         <p:spPr>
           <a:xfrm>
-            <a:off x="1757673" y="818388"/>
+            <a:off x="1973573" y="818388"/>
             <a:ext cx="356616" cy="210312"/>
           </a:xfrm>
           <a:prstGeom prst="rightArrow">
@@ -3430,8 +3435,8 @@
         </p:blipFill>
         <p:spPr>
           <a:xfrm>
-            <a:off x="2358226" y="141998"/>
-            <a:ext cx="1559920" cy="1086191"/>
+            <a:off x="2526532" y="141998"/>
+            <a:ext cx="1391613" cy="968997"/>
           </a:xfrm>
           <a:prstGeom prst="rect">
             <a:avLst/>
@@ -3452,7 +3457,7 @@
         </p:nvSpPr>
         <p:spPr>
           <a:xfrm>
-            <a:off x="2412164" y="1255621"/>
+            <a:off x="2491854" y="1173326"/>
             <a:ext cx="1452044" cy="646331"/>
           </a:xfrm>
           <a:prstGeom prst="rect">
@@ -3537,8 +3542,8 @@
         </p:nvSpPr>
         <p:spPr>
           <a:xfrm>
-            <a:off x="4695848" y="259743"/>
-            <a:ext cx="2471600" cy="1200329"/>
+            <a:off x="4660064" y="116598"/>
+            <a:ext cx="1757672" cy="1477328"/>
           </a:xfrm>
           <a:prstGeom prst="rect">
             <a:avLst/>
@@ -3552,18 +3557,77 @@
           <a:lstStyle/>
           <a:p>
             <a:r>
-              <a:rPr lang="de-DE" dirty="0"/>
-              <a:t>Ausschnitt aus zwei Tabellen markiert, welche Spalte genutzt wird</a:t>
-            </a:r>
-          </a:p>
-        </p:txBody>
-      </p:sp>
-      <p:sp>
-        <p:nvSpPr>
-          <p:cNvPr id="13" name="Pfeil: nach rechts 12">
-            <a:extLst>
-              <a:ext uri="{FF2B5EF4-FFF2-40B4-BE49-F238E27FC236}">
-                <a16:creationId xmlns:a16="http://schemas.microsoft.com/office/drawing/2014/main" id="{6AC2FEE5-363D-A0EF-D561-7B5AA89A90C4}"/>
+              <a:rPr lang="de-DE" dirty="0">
+                <a:latin typeface="Artifakt Element Medium" panose="020B0603050000020004" pitchFamily="34" charset="0"/>
+                <a:ea typeface="Artifakt Element Medium" panose="020B0603050000020004" pitchFamily="34" charset="0"/>
+              </a:rPr>
+              <a:t>Select </a:t>
+            </a:r>
+            <a:r>
+              <a:rPr lang="de-DE" dirty="0" err="1">
+                <a:latin typeface="Artifakt Element Medium" panose="020B0603050000020004" pitchFamily="34" charset="0"/>
+                <a:ea typeface="Artifakt Element Medium" panose="020B0603050000020004" pitchFamily="34" charset="0"/>
+              </a:rPr>
+              <a:t>two</a:t>
+            </a:r>
+            <a:r>
+              <a:rPr lang="de-DE" dirty="0">
+                <a:latin typeface="Artifakt Element Medium" panose="020B0603050000020004" pitchFamily="34" charset="0"/>
+                <a:ea typeface="Artifakt Element Medium" panose="020B0603050000020004" pitchFamily="34" charset="0"/>
+              </a:rPr>
+              <a:t> </a:t>
+            </a:r>
+            <a:r>
+              <a:rPr lang="de-DE" dirty="0" err="1">
+                <a:latin typeface="Artifakt Element Medium" panose="020B0603050000020004" pitchFamily="34" charset="0"/>
+                <a:ea typeface="Artifakt Element Medium" panose="020B0603050000020004" pitchFamily="34" charset="0"/>
+              </a:rPr>
+              <a:t>data</a:t>
+            </a:r>
+            <a:r>
+              <a:rPr lang="de-DE" dirty="0">
+                <a:latin typeface="Artifakt Element Medium" panose="020B0603050000020004" pitchFamily="34" charset="0"/>
+                <a:ea typeface="Artifakt Element Medium" panose="020B0603050000020004" pitchFamily="34" charset="0"/>
+              </a:rPr>
+              <a:t> </a:t>
+            </a:r>
+            <a:r>
+              <a:rPr lang="de-DE" dirty="0" err="1">
+                <a:latin typeface="Artifakt Element Medium" panose="020B0603050000020004" pitchFamily="34" charset="0"/>
+                <a:ea typeface="Artifakt Element Medium" panose="020B0603050000020004" pitchFamily="34" charset="0"/>
+              </a:rPr>
+              <a:t>frames</a:t>
+            </a:r>
+            <a:r>
+              <a:rPr lang="de-DE" dirty="0">
+                <a:latin typeface="Artifakt Element Medium" panose="020B0603050000020004" pitchFamily="34" charset="0"/>
+                <a:ea typeface="Artifakt Element Medium" panose="020B0603050000020004" pitchFamily="34" charset="0"/>
+              </a:rPr>
+              <a:t> (df1, df2) &amp; </a:t>
+            </a:r>
+            <a:r>
+              <a:rPr lang="de-DE" dirty="0" err="1">
+                <a:latin typeface="Artifakt Element Medium" panose="020B0603050000020004" pitchFamily="34" charset="0"/>
+                <a:ea typeface="Artifakt Element Medium" panose="020B0603050000020004" pitchFamily="34" charset="0"/>
+              </a:rPr>
+              <a:t>create</a:t>
+            </a:r>
+            <a:r>
+              <a:rPr lang="de-DE" dirty="0">
+                <a:latin typeface="Artifakt Element Medium" panose="020B0603050000020004" pitchFamily="34" charset="0"/>
+                <a:ea typeface="Artifakt Element Medium" panose="020B0603050000020004" pitchFamily="34" charset="0"/>
+              </a:rPr>
+              <a:t>         2D-Colormap</a:t>
+            </a:r>
+          </a:p>
+        </p:txBody>
+      </p:sp>
+      <p:sp>
+        <p:nvSpPr>
+          <p:cNvPr id="15" name="Rechteck 14">
+            <a:extLst>
+              <a:ext uri="{FF2B5EF4-FFF2-40B4-BE49-F238E27FC236}">
+                <a16:creationId xmlns:a16="http://schemas.microsoft.com/office/drawing/2014/main" id="{0C47150C-6A25-8860-EA9B-341AF6AA9DF2}"/>
               </a:ext>
             </a:extLst>
           </p:cNvPr>
@@ -3572,89 +3636,8 @@
         </p:nvSpPr>
         <p:spPr>
           <a:xfrm>
-            <a:off x="7311785" y="818387"/>
-            <a:ext cx="356616" cy="210312"/>
-          </a:xfrm>
-          <a:prstGeom prst="rightArrow">
-            <a:avLst/>
-          </a:prstGeom>
-        </p:spPr>
-        <p:style>
-          <a:lnRef idx="2">
-            <a:schemeClr val="accent1">
-              <a:shade val="15000"/>
-            </a:schemeClr>
-          </a:lnRef>
-          <a:fillRef idx="1">
-            <a:schemeClr val="accent1"/>
-          </a:fillRef>
-          <a:effectRef idx="0">
-            <a:schemeClr val="accent1"/>
-          </a:effectRef>
-          <a:fontRef idx="minor">
-            <a:schemeClr val="lt1"/>
-          </a:fontRef>
-        </p:style>
-        <p:txBody>
-          <a:bodyPr rtlCol="0" anchor="ctr"/>
-          <a:lstStyle/>
-          <a:p>
-            <a:pPr algn="ctr"/>
-            <a:endParaRPr lang="de-DE"/>
-          </a:p>
-        </p:txBody>
-      </p:sp>
-      <p:sp>
-        <p:nvSpPr>
-          <p:cNvPr id="14" name="Textfeld 13">
-            <a:extLst>
-              <a:ext uri="{FF2B5EF4-FFF2-40B4-BE49-F238E27FC236}">
-                <a16:creationId xmlns:a16="http://schemas.microsoft.com/office/drawing/2014/main" id="{ED3AF219-B401-0A7C-6005-DF715EA73C3D}"/>
-              </a:ext>
-            </a:extLst>
-          </p:cNvPr>
-          <p:cNvSpPr txBox="1"/>
-          <p:nvPr/>
-        </p:nvSpPr>
-        <p:spPr>
-          <a:xfrm>
-            <a:off x="8156448" y="738877"/>
-            <a:ext cx="2651760" cy="369332"/>
-          </a:xfrm>
-          <a:prstGeom prst="rect">
-            <a:avLst/>
-          </a:prstGeom>
-          <a:noFill/>
-        </p:spPr>
-        <p:txBody>
-          <a:bodyPr wrap="square" rtlCol="0">
-            <a:spAutoFit/>
-          </a:bodyPr>
-          <a:lstStyle/>
-          <a:p>
-            <a:r>
-              <a:rPr lang="de-DE" dirty="0"/>
-              <a:t>2-DColormap</a:t>
-            </a:r>
-          </a:p>
-        </p:txBody>
-      </p:sp>
-      <p:sp>
-        <p:nvSpPr>
-          <p:cNvPr id="15" name="Rechteck 14">
-            <a:extLst>
-              <a:ext uri="{FF2B5EF4-FFF2-40B4-BE49-F238E27FC236}">
-                <a16:creationId xmlns:a16="http://schemas.microsoft.com/office/drawing/2014/main" id="{0C47150C-6A25-8860-EA9B-341AF6AA9DF2}"/>
-              </a:ext>
-            </a:extLst>
-          </p:cNvPr>
-          <p:cNvSpPr/>
-          <p:nvPr/>
-        </p:nvSpPr>
-        <p:spPr>
-          <a:xfrm>
-            <a:off x="17998" y="2011680"/>
-            <a:ext cx="7498370" cy="4846320"/>
+            <a:off x="17998" y="2046578"/>
+            <a:ext cx="8448880" cy="4811422"/>
           </a:xfrm>
           <a:prstGeom prst="rect">
             <a:avLst/>
@@ -3742,8 +3725,8 @@
         </p:nvSpPr>
         <p:spPr>
           <a:xfrm>
-            <a:off x="8028432" y="2498257"/>
-            <a:ext cx="2496312" cy="930743"/>
+            <a:off x="9133346" y="818387"/>
+            <a:ext cx="3045968" cy="1282954"/>
           </a:xfrm>
           <a:prstGeom prst="rect">
             <a:avLst/>
@@ -3772,138 +3755,6 @@
           </a:p>
         </p:txBody>
       </p:sp>
-      <p:sp>
-        <p:nvSpPr>
-          <p:cNvPr id="18" name="Rechteck 17">
-            <a:extLst>
-              <a:ext uri="{FF2B5EF4-FFF2-40B4-BE49-F238E27FC236}">
-                <a16:creationId xmlns:a16="http://schemas.microsoft.com/office/drawing/2014/main" id="{6A82E924-A504-6BFB-1730-805B0B1DDB85}"/>
-              </a:ext>
-            </a:extLst>
-          </p:cNvPr>
-          <p:cNvSpPr/>
-          <p:nvPr/>
-        </p:nvSpPr>
-        <p:spPr>
-          <a:xfrm>
-            <a:off x="8028432" y="3594241"/>
-            <a:ext cx="2496312" cy="930743"/>
-          </a:xfrm>
-          <a:prstGeom prst="rect">
-            <a:avLst/>
-          </a:prstGeom>
-        </p:spPr>
-        <p:style>
-          <a:lnRef idx="2">
-            <a:schemeClr val="accent6"/>
-          </a:lnRef>
-          <a:fillRef idx="1">
-            <a:schemeClr val="lt1"/>
-          </a:fillRef>
-          <a:effectRef idx="0">
-            <a:schemeClr val="accent6"/>
-          </a:effectRef>
-          <a:fontRef idx="minor">
-            <a:schemeClr val="dk1"/>
-          </a:fontRef>
-        </p:style>
-        <p:txBody>
-          <a:bodyPr rtlCol="0" anchor="ctr"/>
-          <a:lstStyle/>
-          <a:p>
-            <a:pPr algn="ctr"/>
-            <a:endParaRPr lang="de-DE"/>
-          </a:p>
-        </p:txBody>
-      </p:sp>
-      <p:sp>
-        <p:nvSpPr>
-          <p:cNvPr id="19" name="Rechteck 18">
-            <a:extLst>
-              <a:ext uri="{FF2B5EF4-FFF2-40B4-BE49-F238E27FC236}">
-                <a16:creationId xmlns:a16="http://schemas.microsoft.com/office/drawing/2014/main" id="{5E2BC45E-F03B-920C-BF00-3A886FA75D6C}"/>
-              </a:ext>
-            </a:extLst>
-          </p:cNvPr>
-          <p:cNvSpPr/>
-          <p:nvPr/>
-        </p:nvSpPr>
-        <p:spPr>
-          <a:xfrm>
-            <a:off x="8028432" y="4784617"/>
-            <a:ext cx="2496312" cy="930743"/>
-          </a:xfrm>
-          <a:prstGeom prst="rect">
-            <a:avLst/>
-          </a:prstGeom>
-        </p:spPr>
-        <p:style>
-          <a:lnRef idx="2">
-            <a:schemeClr val="accent6"/>
-          </a:lnRef>
-          <a:fillRef idx="1">
-            <a:schemeClr val="lt1"/>
-          </a:fillRef>
-          <a:effectRef idx="0">
-            <a:schemeClr val="accent6"/>
-          </a:effectRef>
-          <a:fontRef idx="minor">
-            <a:schemeClr val="dk1"/>
-          </a:fontRef>
-        </p:style>
-        <p:txBody>
-          <a:bodyPr rtlCol="0" anchor="ctr"/>
-          <a:lstStyle/>
-          <a:p>
-            <a:pPr algn="ctr"/>
-            <a:endParaRPr lang="de-DE"/>
-          </a:p>
-        </p:txBody>
-      </p:sp>
-      <p:sp>
-        <p:nvSpPr>
-          <p:cNvPr id="20" name="Rechteck 19">
-            <a:extLst>
-              <a:ext uri="{FF2B5EF4-FFF2-40B4-BE49-F238E27FC236}">
-                <a16:creationId xmlns:a16="http://schemas.microsoft.com/office/drawing/2014/main" id="{D4880816-922D-F7E0-8A41-1070142BD105}"/>
-              </a:ext>
-            </a:extLst>
-          </p:cNvPr>
-          <p:cNvSpPr/>
-          <p:nvPr/>
-        </p:nvSpPr>
-        <p:spPr>
-          <a:xfrm>
-            <a:off x="8028432" y="5857566"/>
-            <a:ext cx="2496312" cy="930743"/>
-          </a:xfrm>
-          <a:prstGeom prst="rect">
-            <a:avLst/>
-          </a:prstGeom>
-        </p:spPr>
-        <p:style>
-          <a:lnRef idx="2">
-            <a:schemeClr val="accent6"/>
-          </a:lnRef>
-          <a:fillRef idx="1">
-            <a:schemeClr val="lt1"/>
-          </a:fillRef>
-          <a:effectRef idx="0">
-            <a:schemeClr val="accent6"/>
-          </a:effectRef>
-          <a:fontRef idx="minor">
-            <a:schemeClr val="dk1"/>
-          </a:fontRef>
-        </p:style>
-        <p:txBody>
-          <a:bodyPr rtlCol="0" anchor="ctr"/>
-          <a:lstStyle/>
-          <a:p>
-            <a:pPr algn="ctr"/>
-            <a:endParaRPr lang="de-DE"/>
-          </a:p>
-        </p:txBody>
-      </p:sp>
       <p:cxnSp>
         <p:nvCxnSpPr>
           <p:cNvPr id="23" name="Gerade Verbindung mit Pfeil 22">
@@ -3914,6 +3765,7 @@
             </a:extLst>
           </p:cNvPr>
           <p:cNvCxnSpPr>
+            <a:cxnSpLocks/>
             <a:stCxn id="15" idx="3"/>
             <a:endCxn id="17" idx="1"/>
           </p:cNvCxnSpPr>
@@ -3921,8 +3773,8 @@
         </p:nvCxnSpPr>
         <p:spPr>
           <a:xfrm flipV="1">
-            <a:off x="7516368" y="2963629"/>
-            <a:ext cx="512064" cy="1471211"/>
+            <a:off x="8466878" y="1459864"/>
+            <a:ext cx="666468" cy="2992425"/>
           </a:xfrm>
           <a:prstGeom prst="straightConnector1">
             <a:avLst/>
@@ -3958,14 +3810,14 @@
           <p:cNvCxnSpPr>
             <a:cxnSpLocks/>
             <a:stCxn id="15" idx="3"/>
-            <a:endCxn id="18" idx="1"/>
+            <a:endCxn id="55" idx="1"/>
           </p:cNvCxnSpPr>
           <p:nvPr/>
         </p:nvCxnSpPr>
         <p:spPr>
           <a:xfrm flipV="1">
-            <a:off x="7516368" y="4059613"/>
-            <a:ext cx="512064" cy="375227"/>
+            <a:off x="8466878" y="3097871"/>
+            <a:ext cx="658049" cy="1354418"/>
           </a:xfrm>
           <a:prstGeom prst="straightConnector1">
             <a:avLst/>
@@ -4001,14 +3853,14 @@
           <p:cNvCxnSpPr>
             <a:cxnSpLocks/>
             <a:stCxn id="15" idx="3"/>
-            <a:endCxn id="19" idx="1"/>
+            <a:endCxn id="56" idx="1"/>
           </p:cNvCxnSpPr>
           <p:nvPr/>
         </p:nvCxnSpPr>
         <p:spPr>
           <a:xfrm>
-            <a:off x="7516368" y="4434840"/>
-            <a:ext cx="512064" cy="815149"/>
+            <a:off x="8466878" y="4452289"/>
+            <a:ext cx="661156" cy="187002"/>
           </a:xfrm>
           <a:prstGeom prst="straightConnector1">
             <a:avLst/>
@@ -4044,14 +3896,14 @@
           <p:cNvCxnSpPr>
             <a:cxnSpLocks/>
             <a:stCxn id="15" idx="3"/>
-            <a:endCxn id="20" idx="1"/>
+            <a:endCxn id="57" idx="1"/>
           </p:cNvCxnSpPr>
           <p:nvPr/>
         </p:nvCxnSpPr>
         <p:spPr>
           <a:xfrm>
-            <a:off x="7516368" y="4434840"/>
-            <a:ext cx="512064" cy="1888098"/>
+            <a:off x="8466878" y="4452289"/>
+            <a:ext cx="661156" cy="1758487"/>
           </a:xfrm>
           <a:prstGeom prst="straightConnector1">
             <a:avLst/>
@@ -4089,7 +3941,7 @@
         </p:nvSpPr>
         <p:spPr>
           <a:xfrm>
-            <a:off x="8355591" y="2640462"/>
+            <a:off x="9471891" y="1028698"/>
             <a:ext cx="1645920" cy="646331"/>
           </a:xfrm>
           <a:prstGeom prst="rect">
@@ -4112,10 +3964,10 @@
       </p:sp>
       <p:sp>
         <p:nvSpPr>
-          <p:cNvPr id="35" name="Textfeld 34">
-            <a:extLst>
-              <a:ext uri="{FF2B5EF4-FFF2-40B4-BE49-F238E27FC236}">
-                <a16:creationId xmlns:a16="http://schemas.microsoft.com/office/drawing/2014/main" id="{306890C6-636E-73A1-21D9-0934A49A9318}"/>
+          <p:cNvPr id="43" name="Textfeld 42">
+            <a:extLst>
+              <a:ext uri="{FF2B5EF4-FFF2-40B4-BE49-F238E27FC236}">
+                <a16:creationId xmlns:a16="http://schemas.microsoft.com/office/drawing/2014/main" id="{D004D338-D184-7286-0979-3C77610B906D}"/>
               </a:ext>
             </a:extLst>
           </p:cNvPr>
@@ -4124,112 +3976,7 @@
         </p:nvSpPr>
         <p:spPr>
           <a:xfrm>
-            <a:off x="8355591" y="3721507"/>
-            <a:ext cx="1645920" cy="646331"/>
-          </a:xfrm>
-          <a:prstGeom prst="rect">
-            <a:avLst/>
-          </a:prstGeom>
-          <a:noFill/>
-        </p:spPr>
-        <p:txBody>
-          <a:bodyPr wrap="square" rtlCol="0">
-            <a:spAutoFit/>
-          </a:bodyPr>
-          <a:lstStyle/>
-          <a:p>
-            <a:r>
-              <a:rPr lang="de-DE" dirty="0"/>
-              <a:t>Häufigkeitsverteilung B</a:t>
-            </a:r>
-          </a:p>
-        </p:txBody>
-      </p:sp>
-      <p:sp>
-        <p:nvSpPr>
-          <p:cNvPr id="36" name="Textfeld 35">
-            <a:extLst>
-              <a:ext uri="{FF2B5EF4-FFF2-40B4-BE49-F238E27FC236}">
-                <a16:creationId xmlns:a16="http://schemas.microsoft.com/office/drawing/2014/main" id="{068EDAC1-A5A4-2A5A-C467-9F5B5554F705}"/>
-              </a:ext>
-            </a:extLst>
-          </p:cNvPr>
-          <p:cNvSpPr txBox="1"/>
-          <p:nvPr/>
-        </p:nvSpPr>
-        <p:spPr>
-          <a:xfrm>
-            <a:off x="8540496" y="5047465"/>
-            <a:ext cx="1645920" cy="369332"/>
-          </a:xfrm>
-          <a:prstGeom prst="rect">
-            <a:avLst/>
-          </a:prstGeom>
-          <a:noFill/>
-        </p:spPr>
-        <p:txBody>
-          <a:bodyPr wrap="square" rtlCol="0">
-            <a:spAutoFit/>
-          </a:bodyPr>
-          <a:lstStyle/>
-          <a:p>
-            <a:r>
-              <a:rPr lang="de-DE" dirty="0"/>
-              <a:t>Scatterplot</a:t>
-            </a:r>
-          </a:p>
-        </p:txBody>
-      </p:sp>
-      <p:sp>
-        <p:nvSpPr>
-          <p:cNvPr id="37" name="Textfeld 36">
-            <a:extLst>
-              <a:ext uri="{FF2B5EF4-FFF2-40B4-BE49-F238E27FC236}">
-                <a16:creationId xmlns:a16="http://schemas.microsoft.com/office/drawing/2014/main" id="{6A6481CF-88C3-E5B4-08A9-57DDD70F1CD4}"/>
-              </a:ext>
-            </a:extLst>
-          </p:cNvPr>
-          <p:cNvSpPr txBox="1"/>
-          <p:nvPr/>
-        </p:nvSpPr>
-        <p:spPr>
-          <a:xfrm>
-            <a:off x="8488179" y="5953606"/>
-            <a:ext cx="1645920" cy="369332"/>
-          </a:xfrm>
-          <a:prstGeom prst="rect">
-            <a:avLst/>
-          </a:prstGeom>
-          <a:noFill/>
-        </p:spPr>
-        <p:txBody>
-          <a:bodyPr wrap="square" rtlCol="0">
-            <a:spAutoFit/>
-          </a:bodyPr>
-          <a:lstStyle/>
-          <a:p>
-            <a:r>
-              <a:rPr lang="de-DE" dirty="0"/>
-              <a:t>…</a:t>
-            </a:r>
-          </a:p>
-        </p:txBody>
-      </p:sp>
-      <p:sp>
-        <p:nvSpPr>
-          <p:cNvPr id="43" name="Textfeld 42">
-            <a:extLst>
-              <a:ext uri="{FF2B5EF4-FFF2-40B4-BE49-F238E27FC236}">
-                <a16:creationId xmlns:a16="http://schemas.microsoft.com/office/drawing/2014/main" id="{D004D338-D184-7286-0979-3C77610B906D}"/>
-              </a:ext>
-            </a:extLst>
-          </p:cNvPr>
-          <p:cNvSpPr txBox="1"/>
-          <p:nvPr/>
-        </p:nvSpPr>
-        <p:spPr>
-          <a:xfrm>
-            <a:off x="8021835" y="1963814"/>
+            <a:off x="9622035" y="141998"/>
             <a:ext cx="2313432" cy="369332"/>
           </a:xfrm>
           <a:prstGeom prst="rect">
@@ -4264,7 +4011,7 @@
         </p:nvSpPr>
         <p:spPr>
           <a:xfrm rot="5400000">
-            <a:off x="5415929" y="1514779"/>
+            <a:off x="6235362" y="1676767"/>
             <a:ext cx="356616" cy="210312"/>
           </a:xfrm>
           <a:prstGeom prst="rightArrow">
@@ -4293,6 +4040,293 @@
           <a:p>
             <a:pPr algn="ctr"/>
             <a:endParaRPr lang="de-DE"/>
+          </a:p>
+        </p:txBody>
+      </p:sp>
+      <p:pic>
+        <p:nvPicPr>
+          <p:cNvPr id="39" name="Grafik 38">
+            <a:extLst>
+              <a:ext uri="{FF2B5EF4-FFF2-40B4-BE49-F238E27FC236}">
+                <a16:creationId xmlns:a16="http://schemas.microsoft.com/office/drawing/2014/main" id="{5B747903-8C35-568B-B60B-6BF1C374299B}"/>
+              </a:ext>
+            </a:extLst>
+          </p:cNvPr>
+          <p:cNvPicPr>
+            <a:picLocks noChangeAspect="1"/>
+          </p:cNvPicPr>
+          <p:nvPr/>
+        </p:nvPicPr>
+        <p:blipFill>
+          <a:blip r:embed="rId4">
+            <a:extLst>
+              <a:ext uri="{28A0092B-C50C-407E-A947-70E740481C1C}">
+                <a14:useLocalDpi xmlns:a14="http://schemas.microsoft.com/office/drawing/2010/main" val="0"/>
+              </a:ext>
+            </a:extLst>
+          </a:blip>
+          <a:srcRect t="12336"/>
+          <a:stretch/>
+        </p:blipFill>
+        <p:spPr>
+          <a:xfrm>
+            <a:off x="6308514" y="434147"/>
+            <a:ext cx="2158364" cy="1138303"/>
+          </a:xfrm>
+          <a:prstGeom prst="rect">
+            <a:avLst/>
+          </a:prstGeom>
+        </p:spPr>
+      </p:pic>
+      <p:sp>
+        <p:nvSpPr>
+          <p:cNvPr id="55" name="Rechteck 54">
+            <a:extLst>
+              <a:ext uri="{FF2B5EF4-FFF2-40B4-BE49-F238E27FC236}">
+                <a16:creationId xmlns:a16="http://schemas.microsoft.com/office/drawing/2014/main" id="{8FE65A14-0995-69ED-9045-3E443DAFF360}"/>
+              </a:ext>
+            </a:extLst>
+          </p:cNvPr>
+          <p:cNvSpPr/>
+          <p:nvPr/>
+        </p:nvSpPr>
+        <p:spPr>
+          <a:xfrm>
+            <a:off x="9124927" y="2456394"/>
+            <a:ext cx="3045968" cy="1282954"/>
+          </a:xfrm>
+          <a:prstGeom prst="rect">
+            <a:avLst/>
+          </a:prstGeom>
+        </p:spPr>
+        <p:style>
+          <a:lnRef idx="2">
+            <a:schemeClr val="accent6"/>
+          </a:lnRef>
+          <a:fillRef idx="1">
+            <a:schemeClr val="lt1"/>
+          </a:fillRef>
+          <a:effectRef idx="0">
+            <a:schemeClr val="accent6"/>
+          </a:effectRef>
+          <a:fontRef idx="minor">
+            <a:schemeClr val="dk1"/>
+          </a:fontRef>
+        </p:style>
+        <p:txBody>
+          <a:bodyPr rtlCol="0" anchor="ctr"/>
+          <a:lstStyle/>
+          <a:p>
+            <a:pPr algn="ctr"/>
+            <a:endParaRPr lang="de-DE"/>
+          </a:p>
+        </p:txBody>
+      </p:sp>
+      <p:sp>
+        <p:nvSpPr>
+          <p:cNvPr id="56" name="Rechteck 55">
+            <a:extLst>
+              <a:ext uri="{FF2B5EF4-FFF2-40B4-BE49-F238E27FC236}">
+                <a16:creationId xmlns:a16="http://schemas.microsoft.com/office/drawing/2014/main" id="{8A786CF1-E8E2-A8C8-89D7-9578A15257CA}"/>
+              </a:ext>
+            </a:extLst>
+          </p:cNvPr>
+          <p:cNvSpPr/>
+          <p:nvPr/>
+        </p:nvSpPr>
+        <p:spPr>
+          <a:xfrm>
+            <a:off x="9128034" y="3997814"/>
+            <a:ext cx="3045968" cy="1282954"/>
+          </a:xfrm>
+          <a:prstGeom prst="rect">
+            <a:avLst/>
+          </a:prstGeom>
+        </p:spPr>
+        <p:style>
+          <a:lnRef idx="2">
+            <a:schemeClr val="accent6"/>
+          </a:lnRef>
+          <a:fillRef idx="1">
+            <a:schemeClr val="lt1"/>
+          </a:fillRef>
+          <a:effectRef idx="0">
+            <a:schemeClr val="accent6"/>
+          </a:effectRef>
+          <a:fontRef idx="minor">
+            <a:schemeClr val="dk1"/>
+          </a:fontRef>
+        </p:style>
+        <p:txBody>
+          <a:bodyPr rtlCol="0" anchor="ctr"/>
+          <a:lstStyle/>
+          <a:p>
+            <a:pPr algn="ctr"/>
+            <a:endParaRPr lang="de-DE"/>
+          </a:p>
+        </p:txBody>
+      </p:sp>
+      <p:sp>
+        <p:nvSpPr>
+          <p:cNvPr id="57" name="Rechteck 56">
+            <a:extLst>
+              <a:ext uri="{FF2B5EF4-FFF2-40B4-BE49-F238E27FC236}">
+                <a16:creationId xmlns:a16="http://schemas.microsoft.com/office/drawing/2014/main" id="{B0C3FAB7-66BE-E941-DC97-77872D40D8C2}"/>
+              </a:ext>
+            </a:extLst>
+          </p:cNvPr>
+          <p:cNvSpPr/>
+          <p:nvPr/>
+        </p:nvSpPr>
+        <p:spPr>
+          <a:xfrm>
+            <a:off x="9128034" y="5569299"/>
+            <a:ext cx="3045968" cy="1282954"/>
+          </a:xfrm>
+          <a:prstGeom prst="rect">
+            <a:avLst/>
+          </a:prstGeom>
+        </p:spPr>
+        <p:style>
+          <a:lnRef idx="2">
+            <a:schemeClr val="accent6"/>
+          </a:lnRef>
+          <a:fillRef idx="1">
+            <a:schemeClr val="lt1"/>
+          </a:fillRef>
+          <a:effectRef idx="0">
+            <a:schemeClr val="accent6"/>
+          </a:effectRef>
+          <a:fontRef idx="minor">
+            <a:schemeClr val="dk1"/>
+          </a:fontRef>
+        </p:style>
+        <p:txBody>
+          <a:bodyPr rtlCol="0" anchor="ctr"/>
+          <a:lstStyle/>
+          <a:p>
+            <a:pPr algn="ctr"/>
+            <a:endParaRPr lang="de-DE"/>
+          </a:p>
+        </p:txBody>
+      </p:sp>
+      <p:sp>
+        <p:nvSpPr>
+          <p:cNvPr id="35" name="Textfeld 34">
+            <a:extLst>
+              <a:ext uri="{FF2B5EF4-FFF2-40B4-BE49-F238E27FC236}">
+                <a16:creationId xmlns:a16="http://schemas.microsoft.com/office/drawing/2014/main" id="{306890C6-636E-73A1-21D9-0934A49A9318}"/>
+              </a:ext>
+            </a:extLst>
+          </p:cNvPr>
+          <p:cNvSpPr txBox="1"/>
+          <p:nvPr/>
+        </p:nvSpPr>
+        <p:spPr>
+          <a:xfrm>
+            <a:off x="9582754" y="2715355"/>
+            <a:ext cx="1645920" cy="646331"/>
+          </a:xfrm>
+          <a:prstGeom prst="rect">
+            <a:avLst/>
+          </a:prstGeom>
+          <a:noFill/>
+        </p:spPr>
+        <p:txBody>
+          <a:bodyPr wrap="square" rtlCol="0">
+            <a:spAutoFit/>
+          </a:bodyPr>
+          <a:lstStyle/>
+          <a:p>
+            <a:r>
+              <a:rPr lang="de-DE" dirty="0"/>
+              <a:t>Häufigkeitsverteilung B</a:t>
+            </a:r>
+          </a:p>
+        </p:txBody>
+      </p:sp>
+      <p:sp>
+        <p:nvSpPr>
+          <p:cNvPr id="36" name="Textfeld 35">
+            <a:extLst>
+              <a:ext uri="{FF2B5EF4-FFF2-40B4-BE49-F238E27FC236}">
+                <a16:creationId xmlns:a16="http://schemas.microsoft.com/office/drawing/2014/main" id="{068EDAC1-A5A4-2A5A-C467-9F5B5554F705}"/>
+              </a:ext>
+            </a:extLst>
+          </p:cNvPr>
+          <p:cNvSpPr txBox="1"/>
+          <p:nvPr/>
+        </p:nvSpPr>
+        <p:spPr>
+          <a:xfrm>
+            <a:off x="9622035" y="4380312"/>
+            <a:ext cx="1645920" cy="369332"/>
+          </a:xfrm>
+          <a:prstGeom prst="rect">
+            <a:avLst/>
+          </a:prstGeom>
+          <a:noFill/>
+        </p:spPr>
+        <p:txBody>
+          <a:bodyPr wrap="square" rtlCol="0">
+            <a:spAutoFit/>
+          </a:bodyPr>
+          <a:lstStyle/>
+          <a:p>
+            <a:r>
+              <a:rPr lang="de-DE" dirty="0"/>
+              <a:t>Scatterplot</a:t>
+            </a:r>
+          </a:p>
+        </p:txBody>
+      </p:sp>
+      <p:sp>
+        <p:nvSpPr>
+          <p:cNvPr id="66" name="Textfeld 65">
+            <a:extLst>
+              <a:ext uri="{FF2B5EF4-FFF2-40B4-BE49-F238E27FC236}">
+                <a16:creationId xmlns:a16="http://schemas.microsoft.com/office/drawing/2014/main" id="{3801DFBC-0208-A5C5-7FB5-4E83F05275D5}"/>
+              </a:ext>
+            </a:extLst>
+          </p:cNvPr>
+          <p:cNvSpPr txBox="1"/>
+          <p:nvPr/>
+        </p:nvSpPr>
+        <p:spPr>
+          <a:xfrm>
+            <a:off x="-122233" y="1173326"/>
+            <a:ext cx="2136469" cy="646331"/>
+          </a:xfrm>
+          <a:prstGeom prst="rect">
+            <a:avLst/>
+          </a:prstGeom>
+          <a:noFill/>
+        </p:spPr>
+        <p:txBody>
+          <a:bodyPr wrap="square" rtlCol="0">
+            <a:spAutoFit/>
+          </a:bodyPr>
+          <a:lstStyle/>
+          <a:p>
+            <a:pPr algn="ctr"/>
+            <a:r>
+              <a:rPr lang="de-DE" dirty="0">
+                <a:latin typeface="Artifakt Element Medium" panose="020B0603050000020004" pitchFamily="34" charset="0"/>
+                <a:ea typeface="Artifakt Element Medium" panose="020B0603050000020004" pitchFamily="34" charset="0"/>
+              </a:rPr>
+              <a:t>Environmental &amp; social </a:t>
+            </a:r>
+            <a:r>
+              <a:rPr lang="de-DE" dirty="0" err="1">
+                <a:latin typeface="Artifakt Element Medium" panose="020B0603050000020004" pitchFamily="34" charset="0"/>
+                <a:ea typeface="Artifakt Element Medium" panose="020B0603050000020004" pitchFamily="34" charset="0"/>
+              </a:rPr>
+              <a:t>factors</a:t>
+            </a:r>
+            <a:endParaRPr lang="de-DE" dirty="0">
+              <a:latin typeface="Artifakt Element Medium" panose="020B0603050000020004" pitchFamily="34" charset="0"/>
+              <a:ea typeface="Artifakt Element Medium" panose="020B0603050000020004" pitchFamily="34" charset="0"/>
+            </a:endParaRPr>
           </a:p>
         </p:txBody>
       </p:sp>

</xml_diff>